<commit_message>
added Name to Presantation
</commit_message>
<xml_diff>
--- a/Projekt_4Aay_DustinWalker.pptx
+++ b/Projekt_4Aay_DustinWalker.pptx
@@ -5,7 +5,7 @@
     <p:sldMasterId id="2147483660" r:id="rId1"/>
   </p:sldMasterIdLst>
   <p:notesMasterIdLst>
-    <p:notesMasterId r:id="rId18"/>
+    <p:notesMasterId r:id="rId19"/>
   </p:notesMasterIdLst>
   <p:sldIdLst>
     <p:sldId id="256" r:id="rId2"/>
@@ -24,6 +24,7 @@
     <p:sldId id="269" r:id="rId15"/>
     <p:sldId id="270" r:id="rId16"/>
     <p:sldId id="271" r:id="rId17"/>
+    <p:sldId id="272" r:id="rId18"/>
   </p:sldIdLst>
   <p:sldSz cx="12192000" cy="6858000"/>
   <p:notesSz cx="6858000" cy="9144000"/>
@@ -6269,6 +6270,143 @@
       <p:bldP spid="3" grpId="0" build="p"/>
     </p:bldLst>
   </p:timing>
+</p:sld>
+</file>
+
+<file path=ppt/slides/slide17.xml><?xml version="1.0" encoding="utf-8"?>
+<p:sld xmlns:a="http://schemas.openxmlformats.org/drawingml/2006/main" xmlns:r="http://schemas.openxmlformats.org/officeDocument/2006/relationships" xmlns:p="http://schemas.openxmlformats.org/presentationml/2006/main">
+  <p:cSld>
+    <p:spTree>
+      <p:nvGrpSpPr>
+        <p:cNvPr id="1" name=""/>
+        <p:cNvGrpSpPr/>
+        <p:nvPr/>
+      </p:nvGrpSpPr>
+      <p:grpSpPr>
+        <a:xfrm>
+          <a:off x="0" y="0"/>
+          <a:ext cx="0" cy="0"/>
+          <a:chOff x="0" y="0"/>
+          <a:chExt cx="0" cy="0"/>
+        </a:xfrm>
+      </p:grpSpPr>
+      <p:sp>
+        <p:nvSpPr>
+          <p:cNvPr id="2" name="Titel 1">
+            <a:extLst>
+              <a:ext uri="{FF2B5EF4-FFF2-40B4-BE49-F238E27FC236}">
+                <a16:creationId xmlns:a16="http://schemas.microsoft.com/office/drawing/2014/main" id="{744A4AB8-3E5F-4A8D-B7DB-C9A1B32DA3EE}"/>
+              </a:ext>
+            </a:extLst>
+          </p:cNvPr>
+          <p:cNvSpPr>
+            <a:spLocks noGrp="1"/>
+          </p:cNvSpPr>
+          <p:nvPr>
+            <p:ph type="title"/>
+          </p:nvPr>
+        </p:nvSpPr>
+        <p:spPr/>
+        <p:txBody>
+          <a:bodyPr/>
+          <a:lstStyle/>
+          <a:p>
+            <a:r>
+              <a:rPr lang="de-DE" dirty="0" err="1"/>
+              <a:t>Presented</a:t>
+            </a:r>
+            <a:r>
+              <a:rPr lang="de-DE" dirty="0"/>
+              <a:t> </a:t>
+            </a:r>
+            <a:r>
+              <a:rPr lang="de-DE" dirty="0" err="1"/>
+              <a:t>to</a:t>
+            </a:r>
+            <a:r>
+              <a:rPr lang="de-DE" dirty="0"/>
+              <a:t> </a:t>
+            </a:r>
+            <a:r>
+              <a:rPr lang="de-DE" dirty="0" err="1"/>
+              <a:t>you</a:t>
+            </a:r>
+            <a:r>
+              <a:rPr lang="de-DE" dirty="0"/>
+              <a:t> </a:t>
+            </a:r>
+            <a:r>
+              <a:rPr lang="de-DE" dirty="0" err="1"/>
+              <a:t>by</a:t>
+            </a:r>
+            <a:endParaRPr lang="de-DE" dirty="0"/>
+          </a:p>
+        </p:txBody>
+      </p:sp>
+      <p:sp>
+        <p:nvSpPr>
+          <p:cNvPr id="4" name="Titel 1">
+            <a:extLst>
+              <a:ext uri="{FF2B5EF4-FFF2-40B4-BE49-F238E27FC236}">
+                <a16:creationId xmlns:a16="http://schemas.microsoft.com/office/drawing/2014/main" id="{06C8914B-34FD-4A98-8EFE-7F84AB651E67}"/>
+              </a:ext>
+            </a:extLst>
+          </p:cNvPr>
+          <p:cNvSpPr txBox="1">
+            <a:spLocks/>
+          </p:cNvSpPr>
+          <p:nvPr/>
+        </p:nvSpPr>
+        <p:spPr>
+          <a:xfrm>
+            <a:off x="8333752" y="5251304"/>
+            <a:ext cx="3633165" cy="1325563"/>
+          </a:xfrm>
+          <a:prstGeom prst="rect">
+            <a:avLst/>
+          </a:prstGeom>
+        </p:spPr>
+        <p:txBody>
+          <a:bodyPr vert="horz" lIns="91440" tIns="45720" rIns="91440" bIns="45720" rtlCol="0" anchor="ctr">
+            <a:normAutofit/>
+          </a:bodyPr>
+          <a:lstStyle>
+            <a:lvl1pPr algn="l" defTabSz="914400" rtl="0" eaLnBrk="1" latinLnBrk="0" hangingPunct="1">
+              <a:lnSpc>
+                <a:spcPct val="90000"/>
+              </a:lnSpc>
+              <a:spcBef>
+                <a:spcPct val="0"/>
+              </a:spcBef>
+              <a:buNone/>
+              <a:defRPr sz="4400" kern="1200">
+                <a:solidFill>
+                  <a:schemeClr val="tx1"/>
+                </a:solidFill>
+                <a:latin typeface="+mj-lt"/>
+                <a:ea typeface="+mj-ea"/>
+                <a:cs typeface="+mj-cs"/>
+              </a:defRPr>
+            </a:lvl1pPr>
+          </a:lstStyle>
+          <a:p>
+            <a:r>
+              <a:rPr lang="de-DE" dirty="0"/>
+              <a:t>Dustin Walker</a:t>
+            </a:r>
+          </a:p>
+        </p:txBody>
+      </p:sp>
+    </p:spTree>
+    <p:extLst>
+      <p:ext uri="{BB962C8B-B14F-4D97-AF65-F5344CB8AC3E}">
+        <p14:creationId xmlns:p14="http://schemas.microsoft.com/office/powerpoint/2010/main" val="623553165"/>
+      </p:ext>
+    </p:extLst>
+  </p:cSld>
+  <p:clrMapOvr>
+    <a:masterClrMapping/>
+  </p:clrMapOvr>
 </p:sld>
 </file>
 

</xml_diff>